<commit_message>
Update code for Gaoang's two step approach to getting stop time
</commit_message>
<xml_diff>
--- a/time decision/time decision functions usage.pptx
+++ b/time decision/time decision functions usage.pptx
@@ -107,6 +107,11 @@
       </a:defRPr>
     </a:lvl9pPr>
   </p:defaultTextStyle>
+  <p:extLst>
+    <p:ext uri="{EFAFB233-063F-42B5-8137-9DF3F51BA10A}">
+      <p15:sldGuideLst xmlns:p15="http://schemas.microsoft.com/office/powerpoint/2012/main"/>
+    </p:ext>
+  </p:extLst>
 </p:presentation>
 </file>
 
@@ -257,7 +262,7 @@
           <a:p>
             <a:fld id="{7E97090A-7129-4A69-A956-DEAFEF1ECEFF}" type="datetimeFigureOut">
               <a:rPr lang="en-US" smtClean="0"/>
-              <a:t>5/20/2019</a:t>
+              <a:t>5/25/2019</a:t>
             </a:fld>
             <a:endParaRPr lang="en-US"/>
           </a:p>
@@ -455,7 +460,7 @@
           <a:p>
             <a:fld id="{7E97090A-7129-4A69-A956-DEAFEF1ECEFF}" type="datetimeFigureOut">
               <a:rPr lang="en-US" smtClean="0"/>
-              <a:t>5/20/2019</a:t>
+              <a:t>5/25/2019</a:t>
             </a:fld>
             <a:endParaRPr lang="en-US"/>
           </a:p>
@@ -663,7 +668,7 @@
           <a:p>
             <a:fld id="{7E97090A-7129-4A69-A956-DEAFEF1ECEFF}" type="datetimeFigureOut">
               <a:rPr lang="en-US" smtClean="0"/>
-              <a:t>5/20/2019</a:t>
+              <a:t>5/25/2019</a:t>
             </a:fld>
             <a:endParaRPr lang="en-US"/>
           </a:p>
@@ -861,7 +866,7 @@
           <a:p>
             <a:fld id="{7E97090A-7129-4A69-A956-DEAFEF1ECEFF}" type="datetimeFigureOut">
               <a:rPr lang="en-US" smtClean="0"/>
-              <a:t>5/20/2019</a:t>
+              <a:t>5/25/2019</a:t>
             </a:fld>
             <a:endParaRPr lang="en-US"/>
           </a:p>
@@ -1136,7 +1141,7 @@
           <a:p>
             <a:fld id="{7E97090A-7129-4A69-A956-DEAFEF1ECEFF}" type="datetimeFigureOut">
               <a:rPr lang="en-US" smtClean="0"/>
-              <a:t>5/20/2019</a:t>
+              <a:t>5/25/2019</a:t>
             </a:fld>
             <a:endParaRPr lang="en-US"/>
           </a:p>
@@ -1401,7 +1406,7 @@
           <a:p>
             <a:fld id="{7E97090A-7129-4A69-A956-DEAFEF1ECEFF}" type="datetimeFigureOut">
               <a:rPr lang="en-US" smtClean="0"/>
-              <a:t>5/20/2019</a:t>
+              <a:t>5/25/2019</a:t>
             </a:fld>
             <a:endParaRPr lang="en-US"/>
           </a:p>
@@ -1813,7 +1818,7 @@
           <a:p>
             <a:fld id="{7E97090A-7129-4A69-A956-DEAFEF1ECEFF}" type="datetimeFigureOut">
               <a:rPr lang="en-US" smtClean="0"/>
-              <a:t>5/20/2019</a:t>
+              <a:t>5/25/2019</a:t>
             </a:fld>
             <a:endParaRPr lang="en-US"/>
           </a:p>
@@ -1954,7 +1959,7 @@
           <a:p>
             <a:fld id="{7E97090A-7129-4A69-A956-DEAFEF1ECEFF}" type="datetimeFigureOut">
               <a:rPr lang="en-US" smtClean="0"/>
-              <a:t>5/20/2019</a:t>
+              <a:t>5/25/2019</a:t>
             </a:fld>
             <a:endParaRPr lang="en-US"/>
           </a:p>
@@ -2067,7 +2072,7 @@
           <a:p>
             <a:fld id="{7E97090A-7129-4A69-A956-DEAFEF1ECEFF}" type="datetimeFigureOut">
               <a:rPr lang="en-US" smtClean="0"/>
-              <a:t>5/20/2019</a:t>
+              <a:t>5/25/2019</a:t>
             </a:fld>
             <a:endParaRPr lang="en-US"/>
           </a:p>
@@ -2378,7 +2383,7 @@
           <a:p>
             <a:fld id="{7E97090A-7129-4A69-A956-DEAFEF1ECEFF}" type="datetimeFigureOut">
               <a:rPr lang="en-US" smtClean="0"/>
-              <a:t>5/20/2019</a:t>
+              <a:t>5/25/2019</a:t>
             </a:fld>
             <a:endParaRPr lang="en-US"/>
           </a:p>
@@ -2666,7 +2671,7 @@
           <a:p>
             <a:fld id="{7E97090A-7129-4A69-A956-DEAFEF1ECEFF}" type="datetimeFigureOut">
               <a:rPr lang="en-US" smtClean="0"/>
-              <a:t>5/20/2019</a:t>
+              <a:t>5/25/2019</a:t>
             </a:fld>
             <a:endParaRPr lang="en-US"/>
           </a:p>
@@ -2907,7 +2912,7 @@
           <a:p>
             <a:fld id="{7E97090A-7129-4A69-A956-DEAFEF1ECEFF}" type="datetimeFigureOut">
               <a:rPr lang="en-US" smtClean="0"/>
-              <a:t>5/20/2019</a:t>
+              <a:t>5/25/2019</a:t>
             </a:fld>
             <a:endParaRPr lang="en-US"/>
           </a:p>
@@ -3496,6 +3501,21 @@
             </a:r>
           </a:p>
           <a:p>
+            <a:pPr lvl="1"/>
+            <a:r>
+              <a:rPr lang="en-US" dirty="0"/>
+              <a:t>Outputs trajectory of anomaly IDs into folder “</a:t>
+            </a:r>
+            <a:r>
+              <a:rPr lang="en-US" dirty="0" err="1"/>
+              <a:t>anomaly_candidate_trajectory</a:t>
+            </a:r>
+            <a:r>
+              <a:rPr lang="en-US" dirty="0"/>
+              <a:t>”</a:t>
+            </a:r>
+          </a:p>
+          <a:p>
             <a:pPr marL="457200" lvl="1" indent="0">
               <a:buNone/>
             </a:pPr>
@@ -3594,6 +3614,58 @@
           <a:p>
             <a:r>
               <a:rPr lang="en-US" dirty="0"/>
+              <a:t>Get slow down time with “</a:t>
+            </a:r>
+            <a:r>
+              <a:rPr lang="en-US" dirty="0" err="1"/>
+              <a:t>get_slowdown_time.m</a:t>
+            </a:r>
+            <a:r>
+              <a:rPr lang="en-US" dirty="0"/>
+              <a:t>”</a:t>
+            </a:r>
+          </a:p>
+          <a:p>
+            <a:pPr lvl="1"/>
+            <a:r>
+              <a:rPr lang="en-US" dirty="0"/>
+              <a:t>Takes path to “</a:t>
+            </a:r>
+            <a:r>
+              <a:rPr lang="en-US" dirty="0" err="1"/>
+              <a:t>anomaly_candidate_trajectory</a:t>
+            </a:r>
+            <a:r>
+              <a:rPr lang="en-US" dirty="0"/>
+              <a:t>” as input</a:t>
+            </a:r>
+          </a:p>
+          <a:p>
+            <a:pPr lvl="1"/>
+            <a:r>
+              <a:rPr lang="en-US" dirty="0"/>
+              <a:t>Uses function in “</a:t>
+            </a:r>
+            <a:r>
+              <a:rPr lang="en-US" dirty="0" err="1"/>
+              <a:t>anomalyStart.m</a:t>
+            </a:r>
+            <a:r>
+              <a:rPr lang="en-US"/>
+              <a:t>”</a:t>
+            </a:r>
+            <a:endParaRPr lang="en-US" dirty="0"/>
+          </a:p>
+          <a:p>
+            <a:pPr lvl="1"/>
+            <a:r>
+              <a:rPr lang="en-US" dirty="0"/>
+              <a:t>Outputs “anomaly_candidate_curvefit.txt” which has [video #] [part #] [ID #] [slowdown time]</a:t>
+            </a:r>
+          </a:p>
+          <a:p>
+            <a:r>
+              <a:rPr lang="en-US" dirty="0"/>
               <a:t>Get stop time with “get_stop_time.py”</a:t>
             </a:r>
           </a:p>
@@ -3601,7 +3673,7 @@
             <a:pPr lvl="1"/>
             <a:r>
               <a:rPr lang="en-US" dirty="0"/>
-              <a:t>Takes “anomaly_candidate_ID.txt” as input</a:t>
+              <a:t>Takes “anomaly_candidate_curvefit.txt” as input</a:t>
             </a:r>
           </a:p>
           <a:p>
@@ -3742,6 +3814,18 @@
               <a:rPr lang="en-US" dirty="0"/>
               <a:t>) as input</a:t>
             </a:r>
+          </a:p>
+          <a:p>
+            <a:pPr lvl="1"/>
+            <a:r>
+              <a:rPr lang="en-US" dirty="0"/>
+              <a:t>Takes path </a:t>
+            </a:r>
+            <a:r>
+              <a:rPr lang="en-US"/>
+              <a:t>of grass masks</a:t>
+            </a:r>
+            <a:endParaRPr lang="en-US" dirty="0"/>
           </a:p>
           <a:p>
             <a:pPr lvl="1"/>

</xml_diff>